<commit_message>
Working on PIR model.
</commit_message>
<xml_diff>
--- a/AIR_flowchart.pptx
+++ b/AIR_flowchart.pptx
@@ -305,7 +305,7 @@
             <a:fld id="{1D8BD707-D9CF-40AE-B4C6-C98DA3205C09}" type="datetimeFigureOut">
               <a:rPr lang="en-US" smtClean="0"/>
               <a:pPr/>
-              <a:t>3/13/2015</a:t>
+              <a:t>4/29/2015</a:t>
             </a:fld>
             <a:endParaRPr lang="en-US"/>
           </a:p>
@@ -472,7 +472,7 @@
             <a:fld id="{1D8BD707-D9CF-40AE-B4C6-C98DA3205C09}" type="datetimeFigureOut">
               <a:rPr lang="en-US" smtClean="0"/>
               <a:pPr/>
-              <a:t>3/13/2015</a:t>
+              <a:t>4/29/2015</a:t>
             </a:fld>
             <a:endParaRPr lang="en-US"/>
           </a:p>
@@ -649,7 +649,7 @@
             <a:fld id="{1D8BD707-D9CF-40AE-B4C6-C98DA3205C09}" type="datetimeFigureOut">
               <a:rPr lang="en-US" smtClean="0"/>
               <a:pPr/>
-              <a:t>3/13/2015</a:t>
+              <a:t>4/29/2015</a:t>
             </a:fld>
             <a:endParaRPr lang="en-US"/>
           </a:p>
@@ -816,7 +816,7 @@
             <a:fld id="{1D8BD707-D9CF-40AE-B4C6-C98DA3205C09}" type="datetimeFigureOut">
               <a:rPr lang="en-US" smtClean="0"/>
               <a:pPr/>
-              <a:t>3/13/2015</a:t>
+              <a:t>4/29/2015</a:t>
             </a:fld>
             <a:endParaRPr lang="en-US"/>
           </a:p>
@@ -1059,7 +1059,7 @@
             <a:fld id="{1D8BD707-D9CF-40AE-B4C6-C98DA3205C09}" type="datetimeFigureOut">
               <a:rPr lang="en-US" smtClean="0"/>
               <a:pPr/>
-              <a:t>3/13/2015</a:t>
+              <a:t>4/29/2015</a:t>
             </a:fld>
             <a:endParaRPr lang="en-US"/>
           </a:p>
@@ -1344,7 +1344,7 @@
             <a:fld id="{1D8BD707-D9CF-40AE-B4C6-C98DA3205C09}" type="datetimeFigureOut">
               <a:rPr lang="en-US" smtClean="0"/>
               <a:pPr/>
-              <a:t>3/13/2015</a:t>
+              <a:t>4/29/2015</a:t>
             </a:fld>
             <a:endParaRPr lang="en-US"/>
           </a:p>
@@ -1763,7 +1763,7 @@
             <a:fld id="{1D8BD707-D9CF-40AE-B4C6-C98DA3205C09}" type="datetimeFigureOut">
               <a:rPr lang="en-US" smtClean="0"/>
               <a:pPr/>
-              <a:t>3/13/2015</a:t>
+              <a:t>4/29/2015</a:t>
             </a:fld>
             <a:endParaRPr lang="en-US"/>
           </a:p>
@@ -1878,7 +1878,7 @@
             <a:fld id="{1D8BD707-D9CF-40AE-B4C6-C98DA3205C09}" type="datetimeFigureOut">
               <a:rPr lang="en-US" smtClean="0"/>
               <a:pPr/>
-              <a:t>3/13/2015</a:t>
+              <a:t>4/29/2015</a:t>
             </a:fld>
             <a:endParaRPr lang="en-US"/>
           </a:p>
@@ -1970,7 +1970,7 @@
             <a:fld id="{1D8BD707-D9CF-40AE-B4C6-C98DA3205C09}" type="datetimeFigureOut">
               <a:rPr lang="en-US" smtClean="0"/>
               <a:pPr/>
-              <a:t>3/13/2015</a:t>
+              <a:t>4/29/2015</a:t>
             </a:fld>
             <a:endParaRPr lang="en-US"/>
           </a:p>
@@ -2244,7 +2244,7 @@
             <a:fld id="{1D8BD707-D9CF-40AE-B4C6-C98DA3205C09}" type="datetimeFigureOut">
               <a:rPr lang="en-US" smtClean="0"/>
               <a:pPr/>
-              <a:t>3/13/2015</a:t>
+              <a:t>4/29/2015</a:t>
             </a:fld>
             <a:endParaRPr lang="en-US"/>
           </a:p>
@@ -2494,7 +2494,7 @@
             <a:fld id="{1D8BD707-D9CF-40AE-B4C6-C98DA3205C09}" type="datetimeFigureOut">
               <a:rPr lang="en-US" smtClean="0"/>
               <a:pPr/>
-              <a:t>3/13/2015</a:t>
+              <a:t>4/29/2015</a:t>
             </a:fld>
             <a:endParaRPr lang="en-US"/>
           </a:p>
@@ -2704,7 +2704,7 @@
             <a:fld id="{1D8BD707-D9CF-40AE-B4C6-C98DA3205C09}" type="datetimeFigureOut">
               <a:rPr lang="en-US" smtClean="0"/>
               <a:pPr/>
-              <a:t>3/13/2015</a:t>
+              <a:t>4/29/2015</a:t>
             </a:fld>
             <a:endParaRPr lang="en-US"/>
           </a:p>
@@ -3166,8 +3166,12 @@
               <a:t> + </a:t>
             </a:r>
             <a:r>
-              <a:rPr lang="en-US" i="1" dirty="0" smtClean="0"/>
+              <a:rPr lang="en-US" i="1" dirty="0" err="1" smtClean="0"/>
               <a:t>c</a:t>
+            </a:r>
+            <a:r>
+              <a:rPr lang="en-US" i="1" baseline="-25000" dirty="0" err="1" smtClean="0"/>
+              <a:t>A</a:t>
             </a:r>
             <a:r>
               <a:rPr lang="en-US" dirty="0" smtClean="0"/>
@@ -3221,11 +3225,15 @@
               <a:t> + </a:t>
             </a:r>
             <a:r>
-              <a:rPr lang="en-US" i="1" dirty="0"/>
+              <a:rPr lang="en-US" i="1" smtClean="0"/>
               <a:t>c</a:t>
             </a:r>
             <a:r>
-              <a:rPr lang="en-US" dirty="0" smtClean="0"/>
+              <a:rPr lang="en-US" i="1" baseline="-25000"/>
+              <a:t>A</a:t>
+            </a:r>
+            <a:r>
+              <a:rPr lang="en-US" smtClean="0"/>
               <a:t>?</a:t>
             </a:r>
             <a:endParaRPr lang="en-US" dirty="0"/>

</xml_diff>